<commit_message>
update slides with web link to repo and static page
</commit_message>
<xml_diff>
--- a/Project Cyclistic.pptx
+++ b/Project Cyclistic.pptx
@@ -5883,8 +5883,15 @@
             </a:pPr>
             <a:r>
               <a:rPr lang="en-US" sz="2800" dirty="0"/>
-              <a:t> Weblink:</a:t>
-            </a:r>
+              <a:t> Weblink:  </a:t>
+            </a:r>
+            <a:r>
+              <a:rPr lang="en-US" sz="2800" dirty="0">
+                <a:hlinkClick r:id="rId5"/>
+              </a:rPr>
+              <a:t>https://nforne.github.io/project_cyclistic/</a:t>
+            </a:r>
+            <a:endParaRPr lang="en-US" sz="2800" dirty="0"/>
           </a:p>
         </p:txBody>
       </p:sp>
@@ -9923,21 +9930,21 @@
 </file>
 
 <file path=customXml/item1.xml><?xml version="1.0" encoding="utf-8"?>
+<p:properties xmlns:p="http://schemas.microsoft.com/office/2006/metadata/properties" xmlns:xsi="http://www.w3.org/2001/XMLSchema-instance" xmlns:pc="http://schemas.microsoft.com/office/infopath/2007/PartnerControls">
+  <documentManagement>
+    <Status xmlns="71af3243-3dd4-4a8d-8c0d-dd76da1f02a5">Not started</Status>
+    <MediaServiceKeyPoints xmlns="71af3243-3dd4-4a8d-8c0d-dd76da1f02a5" xsi:nil="true"/>
+  </documentManagement>
+</p:properties>
+</file>
+
+<file path=customXml/item2.xml><?xml version="1.0" encoding="utf-8"?>
 <?mso-contentType ?>
 <FormTemplates xmlns="http://schemas.microsoft.com/sharepoint/v3/contenttype/forms">
   <Display>DocumentLibraryForm</Display>
   <Edit>DocumentLibraryForm</Edit>
   <New>DocumentLibraryForm</New>
 </FormTemplates>
-</file>
-
-<file path=customXml/item2.xml><?xml version="1.0" encoding="utf-8"?>
-<p:properties xmlns:p="http://schemas.microsoft.com/office/2006/metadata/properties" xmlns:xsi="http://www.w3.org/2001/XMLSchema-instance" xmlns:pc="http://schemas.microsoft.com/office/infopath/2007/PartnerControls">
-  <documentManagement>
-    <Status xmlns="71af3243-3dd4-4a8d-8c0d-dd76da1f02a5">Not started</Status>
-    <MediaServiceKeyPoints xmlns="71af3243-3dd4-4a8d-8c0d-dd76da1f02a5" xsi:nil="true"/>
-  </documentManagement>
-</p:properties>
 </file>
 
 <file path=customXml/item3.xml><?xml version="1.0" encoding="utf-8"?>
@@ -10162,19 +10169,19 @@
 </file>
 
 <file path=customXml/itemProps1.xml><?xml version="1.0" encoding="utf-8"?>
-<ds:datastoreItem xmlns:ds="http://schemas.openxmlformats.org/officeDocument/2006/customXml" ds:itemID="{AA3F7EDC-E5B4-4BBC-9D2A-CBE6D46C37AD}">
+<ds:datastoreItem xmlns:ds="http://schemas.openxmlformats.org/officeDocument/2006/customXml" ds:itemID="{A03EEFF0-FB57-4CB4-8BFC-DF397689E2ED}">
   <ds:schemaRefs>
-    <ds:schemaRef ds:uri="http://schemas.microsoft.com/sharepoint/v3/contenttype/forms"/>
+    <ds:schemaRef ds:uri="http://schemas.microsoft.com/office/2006/metadata/properties"/>
+    <ds:schemaRef ds:uri="http://schemas.microsoft.com/office/infopath/2007/PartnerControls"/>
+    <ds:schemaRef ds:uri="71af3243-3dd4-4a8d-8c0d-dd76da1f02a5"/>
   </ds:schemaRefs>
 </ds:datastoreItem>
 </file>
 
 <file path=customXml/itemProps2.xml><?xml version="1.0" encoding="utf-8"?>
-<ds:datastoreItem xmlns:ds="http://schemas.openxmlformats.org/officeDocument/2006/customXml" ds:itemID="{A03EEFF0-FB57-4CB4-8BFC-DF397689E2ED}">
+<ds:datastoreItem xmlns:ds="http://schemas.openxmlformats.org/officeDocument/2006/customXml" ds:itemID="{AA3F7EDC-E5B4-4BBC-9D2A-CBE6D46C37AD}">
   <ds:schemaRefs>
-    <ds:schemaRef ds:uri="http://schemas.microsoft.com/office/2006/metadata/properties"/>
-    <ds:schemaRef ds:uri="http://schemas.microsoft.com/office/infopath/2007/PartnerControls"/>
-    <ds:schemaRef ds:uri="71af3243-3dd4-4a8d-8c0d-dd76da1f02a5"/>
+    <ds:schemaRef ds:uri="http://schemas.microsoft.com/sharepoint/v3/contenttype/forms"/>
   </ds:schemaRefs>
 </ds:datastoreItem>
 </file>

</xml_diff>